<commit_message>
Added final exam info in the Announcements slide.
</commit_message>
<xml_diff>
--- a/Slides/040517.pptx
+++ b/Slides/040517.pptx
@@ -559,11 +559,11 @@
         </c:dLbls>
         <c:marker val="1"/>
         <c:smooth val="0"/>
-        <c:axId val="-1770931312"/>
-        <c:axId val="-1770440480"/>
+        <c:axId val="-1079108944"/>
+        <c:axId val="-1079102000"/>
       </c:lineChart>
       <c:catAx>
-        <c:axId val="-1770931312"/>
+        <c:axId val="-1079108944"/>
         <c:scaling>
           <c:orientation val="minMax"/>
         </c:scaling>
@@ -599,7 +599,7 @@
             </a:solidFill>
           </a:ln>
         </c:spPr>
-        <c:crossAx val="-1770440480"/>
+        <c:crossAx val="-1079102000"/>
         <c:crosses val="autoZero"/>
         <c:auto val="1"/>
         <c:lblAlgn val="ctr"/>
@@ -607,7 +607,7 @@
         <c:noMultiLvlLbl val="0"/>
       </c:catAx>
       <c:valAx>
-        <c:axId val="-1770440480"/>
+        <c:axId val="-1079102000"/>
         <c:scaling>
           <c:orientation val="minMax"/>
           <c:max val="10.0"/>
@@ -644,7 +644,7 @@
             </a:solidFill>
           </a:ln>
         </c:spPr>
-        <c:crossAx val="-1770931312"/>
+        <c:crossAx val="-1079108944"/>
         <c:crosses val="autoZero"/>
         <c:crossBetween val="between"/>
       </c:valAx>
@@ -1214,7 +1214,7 @@
               <ma14:placeholderFlag xmlns:ma14="http://schemas.microsoft.com/office/mac/drawingml/2011/main" val="1"/>
             </a:ext>
             <a:ext uri="{909E8E84-426E-40dd-AFC4-6F175D3DCCD1}">
-              <a14:hiddenFill xmlns:a14="http://schemas.microsoft.com/office/drawing/2010/main" xmlns="">
+              <a14:hiddenFill xmlns="" xmlns:a14="http://schemas.microsoft.com/office/drawing/2010/main">
                 <a:solidFill>
                   <a:srgbClr val="FFFFFF"/>
                 </a:solidFill>
@@ -1389,14 +1389,14 @@
           <a:ln/>
           <a:extLst>
             <a:ext uri="{909E8E84-426E-40dd-AFC4-6F175D3DCCD1}">
-              <a14:hiddenFill xmlns:a14="http://schemas.microsoft.com/office/drawing/2010/main" xmlns="">
+              <a14:hiddenFill xmlns="" xmlns:a14="http://schemas.microsoft.com/office/drawing/2010/main">
                 <a:solidFill>
                   <a:srgbClr val="FFFFFF"/>
                 </a:solidFill>
               </a14:hiddenFill>
             </a:ext>
             <a:ext uri="{91240B29-F687-4f45-9708-019B960494DF}">
-              <a14:hiddenLine xmlns:a14="http://schemas.microsoft.com/office/drawing/2010/main" xmlns="" w="9525">
+              <a14:hiddenLine xmlns="" xmlns:a14="http://schemas.microsoft.com/office/drawing/2010/main" w="9525">
                 <a:solidFill>
                   <a:srgbClr val="000000"/>
                 </a:solidFill>
@@ -1567,14 +1567,14 @@
               <ma14:placeholderFlag xmlns:ma14="http://schemas.microsoft.com/office/mac/drawingml/2011/main" val="1"/>
             </a:ext>
             <a:ext uri="{909E8E84-426E-40dd-AFC4-6F175D3DCCD1}">
-              <a14:hiddenFill xmlns:a14="http://schemas.microsoft.com/office/drawing/2010/main" xmlns="">
+              <a14:hiddenFill xmlns="" xmlns:a14="http://schemas.microsoft.com/office/drawing/2010/main">
                 <a:solidFill>
                   <a:srgbClr val="FFFFFF"/>
                 </a:solidFill>
               </a14:hiddenFill>
             </a:ext>
             <a:ext uri="{91240B29-F687-4f45-9708-019B960494DF}">
-              <a14:hiddenLine xmlns:a14="http://schemas.microsoft.com/office/drawing/2010/main" xmlns="" w="9525">
+              <a14:hiddenLine xmlns="" xmlns:a14="http://schemas.microsoft.com/office/drawing/2010/main" w="9525">
                 <a:solidFill>
                   <a:srgbClr val="000000"/>
                 </a:solidFill>
@@ -7514,14 +7514,14 @@
               <ma14:placeholderFlag xmlns:ma14="http://schemas.microsoft.com/office/mac/drawingml/2011/main" val="1"/>
             </a:ext>
             <a:ext uri="{909E8E84-426E-40dd-AFC4-6F175D3DCCD1}">
-              <a14:hiddenFill xmlns:a14="http://schemas.microsoft.com/office/drawing/2010/main" xmlns="">
+              <a14:hiddenFill xmlns="" xmlns:a14="http://schemas.microsoft.com/office/drawing/2010/main">
                 <a:solidFill>
                   <a:srgbClr val="FFFFFF"/>
                 </a:solidFill>
               </a14:hiddenFill>
             </a:ext>
             <a:ext uri="{91240B29-F687-4f45-9708-019B960494DF}">
-              <a14:hiddenLine xmlns:a14="http://schemas.microsoft.com/office/drawing/2010/main" xmlns="" w="9525">
+              <a14:hiddenLine xmlns="" xmlns:a14="http://schemas.microsoft.com/office/drawing/2010/main" w="9525">
                 <a:solidFill>
                   <a:srgbClr val="000000"/>
                 </a:solidFill>
@@ -8579,7 +8579,6 @@
               <a:rPr lang="en-US" dirty="0" smtClean="0"/>
               <a:t>load balancing </a:t>
             </a:r>
-            <a:endParaRPr lang="en-US" dirty="0" smtClean="0"/>
           </a:p>
         </p:txBody>
       </p:sp>
@@ -13802,7 +13801,6 @@
               <a:rPr lang="en-US" dirty="0" smtClean="0"/>
               <a:t>N now in the millions!</a:t>
             </a:r>
-            <a:endParaRPr lang="en-US" dirty="0" smtClean="0"/>
           </a:p>
         </p:txBody>
       </p:sp>
@@ -23543,7 +23541,6 @@
               <a:rPr lang="en-US" dirty="0" smtClean="0"/>
               <a:t>misconfiguration</a:t>
             </a:r>
-            <a:endParaRPr lang="en-US" dirty="0" smtClean="0"/>
           </a:p>
           <a:p>
             <a:endParaRPr lang="en-US" dirty="0" smtClean="0"/>
@@ -25320,13 +25317,54 @@
                   <a:srgbClr val="0000FF"/>
                 </a:solidFill>
               </a:rPr>
-              <a:t>Teaching evaluations are out!</a:t>
+              <a:t>Final Exam</a:t>
+            </a:r>
+          </a:p>
+          <a:p>
+            <a:pPr lvl="1"/>
+            <a:r>
+              <a:rPr lang="en-US" b="1" dirty="0" smtClean="0"/>
+              <a:t>04/20/17 (THU)</a:t>
+            </a:r>
+            <a:r>
+              <a:rPr lang="en-US" b="1" dirty="0"/>
+              <a:t> </a:t>
+            </a:r>
+            <a:r>
+              <a:rPr lang="en-US" b="1" dirty="0" smtClean="0"/>
+              <a:t>1:30 </a:t>
+            </a:r>
+            <a:r>
+              <a:rPr lang="en-US" b="1" dirty="0"/>
+              <a:t>PM - 3:30 PM </a:t>
+            </a:r>
+            <a:r>
+              <a:rPr lang="en-US" b="1" dirty="0" smtClean="0"/>
+              <a:t>@ 220 CHRYS</a:t>
             </a:r>
             <a:endParaRPr lang="en-US" dirty="0" smtClean="0">
               <a:solidFill>
                 <a:srgbClr val="0000FF"/>
               </a:solidFill>
             </a:endParaRPr>
+          </a:p>
+          <a:p>
+            <a:r>
+              <a:rPr lang="en-US" dirty="0" smtClean="0">
+                <a:solidFill>
+                  <a:srgbClr val="0000FF"/>
+                </a:solidFill>
+              </a:rPr>
+              <a:t>Teaching </a:t>
+            </a:r>
+            <a:r>
+              <a:rPr lang="en-US" dirty="0" smtClean="0">
+                <a:solidFill>
+                  <a:srgbClr val="0000FF"/>
+                </a:solidFill>
+              </a:rPr>
+              <a:t>evaluations are out!</a:t>
+            </a:r>
           </a:p>
         </p:txBody>
       </p:sp>
@@ -25417,7 +25455,79 @@
   <p:timing>
     <p:tnLst>
       <p:par>
-        <p:cTn id="1" dur="indefinite" restart="never" nodeType="tmRoot"/>
+        <p:cTn id="1" dur="indefinite" restart="never" nodeType="tmRoot">
+          <p:childTnLst>
+            <p:seq concurrent="1" nextAc="seek">
+              <p:cTn id="2" dur="indefinite" nodeType="mainSeq">
+                <p:childTnLst>
+                  <p:par>
+                    <p:cTn id="3" fill="hold">
+                      <p:stCondLst>
+                        <p:cond delay="indefinite"/>
+                      </p:stCondLst>
+                      <p:childTnLst>
+                        <p:par>
+                          <p:cTn id="4" fill="hold">
+                            <p:stCondLst>
+                              <p:cond delay="0"/>
+                            </p:stCondLst>
+                            <p:childTnLst>
+                              <p:par>
+                                <p:cTn id="5" presetID="1" presetClass="entr" presetSubtype="0" fill="hold" nodeType="clickEffect">
+                                  <p:stCondLst>
+                                    <p:cond delay="0"/>
+                                  </p:stCondLst>
+                                  <p:childTnLst>
+                                    <p:set>
+                                      <p:cBhvr>
+                                        <p:cTn id="6" dur="1" fill="hold">
+                                          <p:stCondLst>
+                                            <p:cond delay="0"/>
+                                          </p:stCondLst>
+                                        </p:cTn>
+                                        <p:tgtEl>
+                                          <p:spTgt spid="8">
+                                            <p:txEl>
+                                              <p:pRg st="2" end="2"/>
+                                            </p:txEl>
+                                          </p:spTgt>
+                                        </p:tgtEl>
+                                        <p:attrNameLst>
+                                          <p:attrName>style.visibility</p:attrName>
+                                        </p:attrNameLst>
+                                      </p:cBhvr>
+                                      <p:to>
+                                        <p:strVal val="visible"/>
+                                      </p:to>
+                                    </p:set>
+                                  </p:childTnLst>
+                                </p:cTn>
+                              </p:par>
+                            </p:childTnLst>
+                          </p:cTn>
+                        </p:par>
+                      </p:childTnLst>
+                    </p:cTn>
+                  </p:par>
+                </p:childTnLst>
+              </p:cTn>
+              <p:prevCondLst>
+                <p:cond evt="onPrev" delay="0">
+                  <p:tgtEl>
+                    <p:sldTgt/>
+                  </p:tgtEl>
+                </p:cond>
+              </p:prevCondLst>
+              <p:nextCondLst>
+                <p:cond evt="onNext" delay="0">
+                  <p:tgtEl>
+                    <p:sldTgt/>
+                  </p:tgtEl>
+                </p:cond>
+              </p:nextCondLst>
+            </p:seq>
+          </p:childTnLst>
+        </p:cTn>
       </p:par>
     </p:tnLst>
   </p:timing>
@@ -25490,7 +25600,6 @@
               <a:rPr lang="en-US" dirty="0" smtClean="0"/>
               <a:t>L2/L3 design</a:t>
             </a:r>
-            <a:endParaRPr lang="en-US" dirty="0" smtClean="0"/>
           </a:p>
           <a:p>
             <a:pPr lvl="2"/>
@@ -25500,15 +25609,7 @@
             </a:r>
             <a:r>
               <a:rPr lang="en-US" dirty="0" smtClean="0"/>
-              <a:t>ddressing </a:t>
-            </a:r>
-            <a:r>
-              <a:rPr lang="en-US" dirty="0" smtClean="0"/>
-              <a:t>/ routing / forwarding in the </a:t>
-            </a:r>
-            <a:r>
-              <a:rPr lang="en-US" dirty="0" smtClean="0"/>
-              <a:t>Fat-Tree</a:t>
+              <a:t>ddressing / routing / forwarding in the Fat-Tree</a:t>
             </a:r>
             <a:endParaRPr lang="en-US" dirty="0"/>
           </a:p>
@@ -25520,31 +25621,14 @@
                   <a:srgbClr val="0000FF"/>
                 </a:solidFill>
               </a:rPr>
-              <a:t>L4 </a:t>
-            </a:r>
-            <a:r>
-              <a:rPr lang="en-US" dirty="0" smtClean="0">
-                <a:solidFill>
-                  <a:srgbClr val="0000FF"/>
-                </a:solidFill>
-              </a:rPr>
-              <a:t>design</a:t>
-            </a:r>
-            <a:endParaRPr lang="en-US" dirty="0" smtClean="0">
-              <a:solidFill>
-                <a:srgbClr val="0000FF"/>
-              </a:solidFill>
-            </a:endParaRPr>
+              <a:t>L4 design</a:t>
+            </a:r>
           </a:p>
           <a:p>
             <a:pPr lvl="2"/>
             <a:r>
               <a:rPr lang="en-US" dirty="0" smtClean="0"/>
-              <a:t>Transport protocol design (w/ Fat-Tree</a:t>
-            </a:r>
-            <a:r>
-              <a:rPr lang="en-US" dirty="0" smtClean="0"/>
-              <a:t>)</a:t>
+              <a:t>Transport protocol design (w/ Fat-Tree)</a:t>
             </a:r>
           </a:p>
           <a:p>
@@ -26464,11 +26548,7 @@
           <a:p>
             <a:r>
               <a:rPr lang="en-US" dirty="0" smtClean="0"/>
-              <a:t>Tension </a:t>
-            </a:r>
-            <a:r>
-              <a:rPr lang="en-US" dirty="0" smtClean="0"/>
-              <a:t>between </a:t>
+              <a:t>Tension between </a:t>
             </a:r>
             <a:r>
               <a:rPr lang="en-US" dirty="0"/>
@@ -28639,7 +28719,7 @@
     <mc:Choice Requires="p14">
       <p:transition spd="slow" p14:dur="2000" advTm="108963"/>
     </mc:Choice>
-    <mc:Fallback xmlns:mv="urn:schemas-microsoft-com:mac:vml" xmlns="">
+    <mc:Fallback xmlns="" xmlns:mv="urn:schemas-microsoft-com:mac:vml">
       <mp:transition xmlns:mp="http://schemas.microsoft.com/office/mac/powerpoint/2008/main" spd="slow" advTm="108963"/>
     </mc:Fallback>
   </mc:AlternateContent>
@@ -29549,11 +29629,6 @@
               </a:rPr>
               <a:t>Still far from ideal</a:t>
             </a:r>
-            <a:endParaRPr lang="en-US" dirty="0" smtClean="0">
-              <a:solidFill>
-                <a:srgbClr val="0000FF"/>
-              </a:solidFill>
-            </a:endParaRPr>
           </a:p>
           <a:p>
             <a:pPr lvl="1"/>
@@ -29683,7 +29758,7 @@
     <mc:Choice Requires="p14">
       <p:transition spd="slow" p14:dur="2000" advTm="108963"/>
     </mc:Choice>
-    <mc:Fallback xmlns:mv="urn:schemas-microsoft-com:mac:vml" xmlns="">
+    <mc:Fallback xmlns="" xmlns:mv="urn:schemas-microsoft-com:mac:vml">
       <mp:transition xmlns:mp="http://schemas.microsoft.com/office/mac/powerpoint/2008/main" spd="slow" advTm="108963"/>
     </mc:Fallback>
   </mc:AlternateContent>
@@ -30716,11 +30791,7 @@
           <a:p>
             <a:r>
               <a:rPr lang="en-US" dirty="0" smtClean="0"/>
-              <a:t>Recap: Clos </a:t>
-            </a:r>
-            <a:r>
-              <a:rPr lang="en-US" dirty="0" smtClean="0"/>
-              <a:t>topology</a:t>
+              <a:t>Recap: Clos topology</a:t>
             </a:r>
             <a:endParaRPr lang="en-US" dirty="0"/>
           </a:p>
@@ -30768,11 +30839,7 @@
           <a:p>
             <a:r>
               <a:rPr lang="en-US" dirty="0" smtClean="0"/>
-              <a:t>At </a:t>
-            </a:r>
-            <a:r>
-              <a:rPr lang="en-US" dirty="0" smtClean="0"/>
-              <a:t>most k</a:t>
+              <a:t>At most k</a:t>
             </a:r>
             <a:r>
               <a:rPr lang="en-US" baseline="30000" dirty="0" smtClean="0"/>
@@ -30803,13 +30870,8 @@
             <a:pPr lvl="1"/>
             <a:r>
               <a:rPr lang="en-US" dirty="0" smtClean="0"/>
-              <a:t>16 </a:t>
-            </a:r>
-            <a:r>
-              <a:rPr lang="en-US" dirty="0" smtClean="0"/>
-              <a:t>machines</a:t>
-            </a:r>
-            <a:endParaRPr lang="en-US" dirty="0" smtClean="0"/>
+              <a:t>16 machines</a:t>
+            </a:r>
           </a:p>
           <a:p>
             <a:r>
@@ -35333,7 +35395,6 @@
               <a:rPr lang="en-US" dirty="0" smtClean="0"/>
               <a:t>L2/L3 design</a:t>
             </a:r>
-            <a:endParaRPr lang="en-US" dirty="0" smtClean="0"/>
           </a:p>
           <a:p>
             <a:pPr lvl="2"/>
@@ -35343,39 +35404,22 @@
             </a:r>
             <a:r>
               <a:rPr lang="en-US" dirty="0" smtClean="0"/>
-              <a:t>ddressing </a:t>
-            </a:r>
+              <a:t>ddressing / routing / forwarding in the Fat-Tree</a:t>
+            </a:r>
+            <a:endParaRPr lang="en-US" dirty="0"/>
+          </a:p>
+          <a:p>
+            <a:pPr lvl="1"/>
             <a:r>
               <a:rPr lang="en-US" dirty="0" smtClean="0"/>
-              <a:t>/ routing / forwarding in the </a:t>
-            </a:r>
+              <a:t>L4 design</a:t>
+            </a:r>
+          </a:p>
+          <a:p>
+            <a:pPr lvl="2"/>
             <a:r>
               <a:rPr lang="en-US" dirty="0" smtClean="0"/>
-              <a:t>Fat-Tree</a:t>
-            </a:r>
-            <a:endParaRPr lang="en-US" dirty="0"/>
-          </a:p>
-          <a:p>
-            <a:pPr lvl="1"/>
-            <a:r>
-              <a:rPr lang="en-US" dirty="0" smtClean="0"/>
-              <a:t>L4 </a:t>
-            </a:r>
-            <a:r>
-              <a:rPr lang="en-US" dirty="0" smtClean="0"/>
-              <a:t>design</a:t>
-            </a:r>
-            <a:endParaRPr lang="en-US" dirty="0" smtClean="0"/>
-          </a:p>
-          <a:p>
-            <a:pPr lvl="2"/>
-            <a:r>
-              <a:rPr lang="en-US" dirty="0" smtClean="0"/>
-              <a:t>Transport protocol design (w/ Fat-Tree</a:t>
-            </a:r>
-            <a:r>
-              <a:rPr lang="en-US" dirty="0" smtClean="0"/>
-              <a:t>)</a:t>
+              <a:t>Transport protocol design (w/ Fat-Tree)</a:t>
             </a:r>
           </a:p>
           <a:p>
@@ -37859,13 +37903,6 @@
               </a:rPr>
               <a:t>GPS</a:t>
             </a:r>
-            <a:endParaRPr lang="en-US" sz="1200" dirty="0">
-              <a:solidFill>
-                <a:prstClr val="black"/>
-              </a:solidFill>
-              <a:ea typeface="Arial" charset="0"/>
-              <a:cs typeface="Arial" charset="0"/>
-            </a:endParaRPr>
           </a:p>
         </p:txBody>
       </p:sp>
@@ -37906,13 +37943,6 @@
               </a:rPr>
               <a:t>RED</a:t>
             </a:r>
-            <a:endParaRPr lang="en-US" sz="1200" dirty="0">
-              <a:solidFill>
-                <a:prstClr val="black"/>
-              </a:solidFill>
-              <a:ea typeface="Arial" charset="0"/>
-              <a:cs typeface="Arial" charset="0"/>
-            </a:endParaRPr>
           </a:p>
         </p:txBody>
       </p:sp>
@@ -37955,13 +37985,6 @@
               </a:rPr>
               <a:t>WFQ</a:t>
             </a:r>
-            <a:endParaRPr lang="en-US" sz="1200" dirty="0">
-              <a:solidFill>
-                <a:prstClr val="black"/>
-              </a:solidFill>
-              <a:ea typeface="Arial" charset="0"/>
-              <a:cs typeface="Arial" charset="0"/>
-            </a:endParaRPr>
           </a:p>
         </p:txBody>
       </p:sp>
@@ -38002,13 +38025,6 @@
               </a:rPr>
               <a:t>CSFQ</a:t>
             </a:r>
-            <a:endParaRPr lang="en-US" sz="1200" dirty="0">
-              <a:solidFill>
-                <a:prstClr val="black"/>
-              </a:solidFill>
-              <a:ea typeface="Arial" charset="0"/>
-              <a:cs typeface="Arial" charset="0"/>
-            </a:endParaRPr>
           </a:p>
         </p:txBody>
       </p:sp>
@@ -38049,13 +38065,6 @@
               </a:rPr>
               <a:t>ECN</a:t>
             </a:r>
-            <a:endParaRPr lang="en-US" sz="1200" dirty="0">
-              <a:solidFill>
-                <a:prstClr val="black"/>
-              </a:solidFill>
-              <a:ea typeface="Arial" charset="0"/>
-              <a:cs typeface="Arial" charset="0"/>
-            </a:endParaRPr>
           </a:p>
         </p:txBody>
       </p:sp>
@@ -38096,13 +38105,6 @@
               </a:rPr>
               <a:t>XCP</a:t>
             </a:r>
-            <a:endParaRPr lang="en-US" sz="1200" dirty="0">
-              <a:solidFill>
-                <a:prstClr val="black"/>
-              </a:solidFill>
-              <a:ea typeface="Arial" charset="0"/>
-              <a:cs typeface="Arial" charset="0"/>
-            </a:endParaRPr>
           </a:p>
         </p:txBody>
       </p:sp>
@@ -38163,13 +38165,6 @@
               </a:rPr>
               <a:t>TCP</a:t>
             </a:r>
-            <a:endParaRPr lang="en-US" sz="1200" dirty="0">
-              <a:solidFill>
-                <a:prstClr val="black"/>
-              </a:solidFill>
-              <a:ea typeface="Arial" charset="0"/>
-              <a:cs typeface="Arial" charset="0"/>
-            </a:endParaRPr>
           </a:p>
         </p:txBody>
       </p:sp>
@@ -38212,13 +38207,6 @@
               </a:rPr>
               <a:t>DCTCP</a:t>
             </a:r>
-            <a:endParaRPr lang="en-US" sz="1200" dirty="0">
-              <a:solidFill>
-                <a:prstClr val="black"/>
-              </a:solidFill>
-              <a:ea typeface="Arial" charset="0"/>
-              <a:cs typeface="Arial" charset="0"/>
-            </a:endParaRPr>
           </a:p>
         </p:txBody>
       </p:sp>
@@ -38259,13 +38247,6 @@
               </a:rPr>
               <a:t>PDQ</a:t>
             </a:r>
-            <a:endParaRPr lang="en-US" sz="1200" dirty="0">
-              <a:solidFill>
-                <a:prstClr val="black"/>
-              </a:solidFill>
-              <a:ea typeface="Arial" charset="0"/>
-              <a:cs typeface="Arial" charset="0"/>
-            </a:endParaRPr>
           </a:p>
         </p:txBody>
       </p:sp>
@@ -38316,13 +38297,6 @@
               </a:rPr>
               <a:t>3</a:t>
             </a:r>
-            <a:endParaRPr lang="en-US" sz="1200" baseline="30000" dirty="0">
-              <a:solidFill>
-                <a:prstClr val="black"/>
-              </a:solidFill>
-              <a:ea typeface="Arial" charset="0"/>
-              <a:cs typeface="Arial" charset="0"/>
-            </a:endParaRPr>
           </a:p>
         </p:txBody>
       </p:sp>
@@ -38363,13 +38337,6 @@
               </a:rPr>
               <a:t>FCP</a:t>
             </a:r>
-            <a:endParaRPr lang="en-US" sz="1200" dirty="0">
-              <a:solidFill>
-                <a:prstClr val="black"/>
-              </a:solidFill>
-              <a:ea typeface="Arial" charset="0"/>
-              <a:cs typeface="Arial" charset="0"/>
-            </a:endParaRPr>
           </a:p>
         </p:txBody>
       </p:sp>
@@ -38410,13 +38377,6 @@
               </a:rPr>
               <a:t>DeTail</a:t>
             </a:r>
-            <a:endParaRPr lang="en-US" sz="1200" dirty="0">
-              <a:solidFill>
-                <a:prstClr val="black"/>
-              </a:solidFill>
-              <a:ea typeface="Arial" charset="0"/>
-              <a:cs typeface="Arial" charset="0"/>
-            </a:endParaRPr>
           </a:p>
         </p:txBody>
       </p:sp>
@@ -38459,13 +38419,6 @@
               </a:rPr>
               <a:t>pFabric</a:t>
             </a:r>
-            <a:endParaRPr lang="en-US" sz="1200" dirty="0">
-              <a:solidFill>
-                <a:prstClr val="black"/>
-              </a:solidFill>
-              <a:ea typeface="Arial" charset="0"/>
-              <a:cs typeface="Arial" charset="0"/>
-            </a:endParaRPr>
           </a:p>
         </p:txBody>
       </p:sp>
@@ -38709,13 +38662,6 @@
                 </a:rPr>
                 <a:t>2005</a:t>
               </a:r>
-              <a:endParaRPr lang="en-US" sz="1200" dirty="0">
-                <a:solidFill>
-                  <a:prstClr val="black"/>
-                </a:solidFill>
-                <a:ea typeface="Arial" charset="0"/>
-                <a:cs typeface="Arial" charset="0"/>
-              </a:endParaRPr>
             </a:p>
           </p:txBody>
         </p:sp>
@@ -38751,13 +38697,6 @@
                 </a:rPr>
                 <a:t>2010</a:t>
               </a:r>
-              <a:endParaRPr lang="en-US" sz="1200" dirty="0">
-                <a:solidFill>
-                  <a:prstClr val="black"/>
-                </a:solidFill>
-                <a:ea typeface="Arial" charset="0"/>
-                <a:cs typeface="Arial" charset="0"/>
-              </a:endParaRPr>
             </a:p>
           </p:txBody>
         </p:sp>
@@ -38793,13 +38732,6 @@
                 </a:rPr>
                 <a:t>2015</a:t>
               </a:r>
-              <a:endParaRPr lang="en-US" sz="1200" dirty="0">
-                <a:solidFill>
-                  <a:prstClr val="black"/>
-                </a:solidFill>
-                <a:ea typeface="Arial" charset="0"/>
-                <a:cs typeface="Arial" charset="0"/>
-              </a:endParaRPr>
             </a:p>
           </p:txBody>
         </p:sp>
@@ -38887,13 +38819,6 @@
                 </a:rPr>
                 <a:t>1980s</a:t>
               </a:r>
-              <a:endParaRPr lang="en-US" sz="1200" dirty="0">
-                <a:solidFill>
-                  <a:prstClr val="black"/>
-                </a:solidFill>
-                <a:ea typeface="Arial" charset="0"/>
-                <a:cs typeface="Arial" charset="0"/>
-              </a:endParaRPr>
             </a:p>
           </p:txBody>
         </p:sp>
@@ -38929,13 +38854,6 @@
                 </a:rPr>
                 <a:t>1990s</a:t>
               </a:r>
-              <a:endParaRPr lang="en-US" sz="1200" dirty="0">
-                <a:solidFill>
-                  <a:prstClr val="black"/>
-                </a:solidFill>
-                <a:ea typeface="Arial" charset="0"/>
-                <a:cs typeface="Arial" charset="0"/>
-              </a:endParaRPr>
             </a:p>
           </p:txBody>
         </p:sp>
@@ -39023,13 +38941,6 @@
                 </a:rPr>
                 <a:t>2000s</a:t>
               </a:r>
-              <a:endParaRPr lang="en-US" sz="1200" dirty="0">
-                <a:solidFill>
-                  <a:prstClr val="black"/>
-                </a:solidFill>
-                <a:ea typeface="Arial" charset="0"/>
-                <a:cs typeface="Arial" charset="0"/>
-              </a:endParaRPr>
             </a:p>
           </p:txBody>
         </p:sp>
@@ -39107,13 +39018,6 @@
               </a:rPr>
               <a:t>RCP</a:t>
             </a:r>
-            <a:endParaRPr lang="en-US" sz="1200" dirty="0">
-              <a:solidFill>
-                <a:prstClr val="black"/>
-              </a:solidFill>
-              <a:ea typeface="Arial" charset="0"/>
-              <a:cs typeface="Arial" charset="0"/>
-            </a:endParaRPr>
           </a:p>
         </p:txBody>
       </p:sp>
@@ -39393,14 +39297,6 @@
               </a:rPr>
               <a:t>are common in data-parallel applications</a:t>
             </a:r>
-            <a:endParaRPr lang="en-US" sz="2400" dirty="0">
-              <a:solidFill>
-                <a:srgbClr val="333399"/>
-              </a:solidFill>
-              <a:latin typeface="Arial" charset="0"/>
-              <a:ea typeface="Arial" charset="0"/>
-              <a:cs typeface="Arial" charset="0"/>
-            </a:endParaRPr>
           </a:p>
         </p:txBody>
       </p:sp>
@@ -42330,13 +42226,6 @@
                 </a:rPr>
                 <a:t>time</a:t>
               </a:r>
-              <a:endParaRPr lang="en-US" b="0" i="1" dirty="0">
-                <a:solidFill>
-                  <a:schemeClr val="accent2"/>
-                </a:solidFill>
-                <a:ea typeface="Arial" charset="0"/>
-                <a:cs typeface="Arial" charset="0"/>
-              </a:endParaRPr>
             </a:p>
           </p:txBody>
         </p:sp>
@@ -42372,13 +42261,6 @@
                 </a:rPr>
                 <a:t>2</a:t>
               </a:r>
-              <a:endParaRPr lang="en-US" sz="1200" b="0" i="1" dirty="0">
-                <a:solidFill>
-                  <a:schemeClr val="accent2"/>
-                </a:solidFill>
-                <a:ea typeface="Arial" charset="0"/>
-                <a:cs typeface="Arial" charset="0"/>
-              </a:endParaRPr>
             </a:p>
           </p:txBody>
         </p:sp>
@@ -42414,13 +42296,6 @@
                 </a:rPr>
                 <a:t>4</a:t>
               </a:r>
-              <a:endParaRPr lang="en-US" sz="1200" b="0" i="1" dirty="0">
-                <a:solidFill>
-                  <a:schemeClr val="accent2"/>
-                </a:solidFill>
-                <a:ea typeface="Arial" charset="0"/>
-                <a:cs typeface="Arial" charset="0"/>
-              </a:endParaRPr>
             </a:p>
           </p:txBody>
         </p:sp>
@@ -42456,13 +42331,6 @@
                 </a:rPr>
                 <a:t>6</a:t>
               </a:r>
-              <a:endParaRPr lang="en-US" sz="1200" b="0" i="1" dirty="0">
-                <a:solidFill>
-                  <a:schemeClr val="accent2"/>
-                </a:solidFill>
-                <a:ea typeface="Arial" charset="0"/>
-                <a:cs typeface="Arial" charset="0"/>
-              </a:endParaRPr>
             </a:p>
           </p:txBody>
         </p:sp>
@@ -42814,13 +42682,6 @@
                 </a:rPr>
                 <a:t>time</a:t>
               </a:r>
-              <a:endParaRPr lang="en-US" b="0" i="1" dirty="0">
-                <a:solidFill>
-                  <a:schemeClr val="accent2"/>
-                </a:solidFill>
-                <a:ea typeface="Arial" charset="0"/>
-                <a:cs typeface="Arial" charset="0"/>
-              </a:endParaRPr>
             </a:p>
           </p:txBody>
         </p:sp>
@@ -42856,13 +42717,6 @@
                 </a:rPr>
                 <a:t>2</a:t>
               </a:r>
-              <a:endParaRPr lang="en-US" sz="1200" b="0" i="1" dirty="0">
-                <a:solidFill>
-                  <a:schemeClr val="accent2"/>
-                </a:solidFill>
-                <a:ea typeface="Arial" charset="0"/>
-                <a:cs typeface="Arial" charset="0"/>
-              </a:endParaRPr>
             </a:p>
           </p:txBody>
         </p:sp>
@@ -42898,13 +42752,6 @@
                 </a:rPr>
                 <a:t>4</a:t>
               </a:r>
-              <a:endParaRPr lang="en-US" sz="1200" b="0" i="1" dirty="0">
-                <a:solidFill>
-                  <a:schemeClr val="accent2"/>
-                </a:solidFill>
-                <a:ea typeface="Arial" charset="0"/>
-                <a:cs typeface="Arial" charset="0"/>
-              </a:endParaRPr>
             </a:p>
           </p:txBody>
         </p:sp>
@@ -42940,13 +42787,6 @@
                 </a:rPr>
                 <a:t>6</a:t>
               </a:r>
-              <a:endParaRPr lang="en-US" sz="1200" b="0" i="1" dirty="0">
-                <a:solidFill>
-                  <a:schemeClr val="accent2"/>
-                </a:solidFill>
-                <a:ea typeface="Arial" charset="0"/>
-                <a:cs typeface="Arial" charset="0"/>
-              </a:endParaRPr>
             </a:p>
           </p:txBody>
         </p:sp>
@@ -43335,13 +43175,6 @@
                 </a:rPr>
                 <a:t>2</a:t>
               </a:r>
-              <a:endParaRPr lang="en-US" sz="1200" b="0" i="1" dirty="0">
-                <a:solidFill>
-                  <a:schemeClr val="accent2"/>
-                </a:solidFill>
-                <a:ea typeface="Arial" charset="0"/>
-                <a:cs typeface="Arial" charset="0"/>
-              </a:endParaRPr>
             </a:p>
           </p:txBody>
         </p:sp>
@@ -43380,13 +43213,6 @@
                 </a:rPr>
                 <a:t>4</a:t>
               </a:r>
-              <a:endParaRPr lang="en-US" sz="1200" b="0" i="1" dirty="0">
-                <a:solidFill>
-                  <a:schemeClr val="accent2"/>
-                </a:solidFill>
-                <a:ea typeface="Arial" charset="0"/>
-                <a:cs typeface="Arial" charset="0"/>
-              </a:endParaRPr>
             </a:p>
           </p:txBody>
         </p:sp>
@@ -43425,13 +43251,6 @@
                 </a:rPr>
                 <a:t>6</a:t>
               </a:r>
-              <a:endParaRPr lang="en-US" sz="1200" b="0" i="1" dirty="0">
-                <a:solidFill>
-                  <a:schemeClr val="accent2"/>
-                </a:solidFill>
-                <a:ea typeface="Arial" charset="0"/>
-                <a:cs typeface="Arial" charset="0"/>
-              </a:endParaRPr>
             </a:p>
           </p:txBody>
         </p:sp>
@@ -44145,17 +43964,7 @@
                 <a:ea typeface="Arial" charset="0"/>
                 <a:cs typeface="Arial" charset="0"/>
               </a:rPr>
-              <a:t>Coflow2 comp. </a:t>
-            </a:r>
-            <a:r>
-              <a:rPr lang="en-US" sz="1400" b="0" i="1" dirty="0">
-                <a:solidFill>
-                  <a:srgbClr val="000000"/>
-                </a:solidFill>
-                <a:ea typeface="Arial" charset="0"/>
-                <a:cs typeface="Arial" charset="0"/>
-              </a:rPr>
-              <a:t>time = </a:t>
+              <a:t>Coflow2 comp. time = </a:t>
             </a:r>
             <a:r>
               <a:rPr lang="en-US" sz="1400" b="0" i="1" dirty="0" smtClean="0">
@@ -44231,8 +44040,11 @@
                 <a:ea typeface="Arial" charset="0"/>
                 <a:cs typeface="Arial" charset="0"/>
               </a:rPr>
-              <a:t>Coflow1 comp. time = </a:t>
-            </a:r>
+              <a:t>Coflow1 comp. time = 5</a:t>
+            </a:r>
+          </a:p>
+          <a:p>
+            <a:pPr algn="r"/>
             <a:r>
               <a:rPr lang="en-US" sz="1400" b="0" i="1" dirty="0">
                 <a:solidFill>
@@ -44241,37 +44053,7 @@
                 <a:ea typeface="Arial" charset="0"/>
                 <a:cs typeface="Arial" charset="0"/>
               </a:rPr>
-              <a:t>5</a:t>
-            </a:r>
-            <a:endParaRPr lang="en-US" sz="1400" b="0" i="1" dirty="0">
-              <a:solidFill>
-                <a:srgbClr val="000000"/>
-              </a:solidFill>
-              <a:ea typeface="Arial" charset="0"/>
-              <a:cs typeface="Arial" charset="0"/>
-            </a:endParaRPr>
-          </a:p>
-          <a:p>
-            <a:pPr algn="r"/>
-            <a:r>
-              <a:rPr lang="en-US" sz="1400" b="0" i="1" dirty="0">
-                <a:solidFill>
-                  <a:srgbClr val="000000"/>
-                </a:solidFill>
-                <a:ea typeface="Arial" charset="0"/>
-                <a:cs typeface="Arial" charset="0"/>
-              </a:rPr>
-              <a:t>Coflow2 comp. </a:t>
-            </a:r>
-            <a:r>
-              <a:rPr lang="en-US" sz="1400" b="0" i="1" dirty="0">
-                <a:solidFill>
-                  <a:srgbClr val="000000"/>
-                </a:solidFill>
-                <a:ea typeface="Arial" charset="0"/>
-                <a:cs typeface="Arial" charset="0"/>
-              </a:rPr>
-              <a:t>time = </a:t>
+              <a:t>Coflow2 comp. time = </a:t>
             </a:r>
             <a:r>
               <a:rPr lang="en-US" sz="1400" b="0" i="1" dirty="0" smtClean="0">
@@ -44492,13 +44274,6 @@
               </a:rPr>
               <a:t> First</a:t>
             </a:r>
-            <a:endParaRPr lang="en-US" sz="1400" b="0" dirty="0">
-              <a:solidFill>
-                <a:srgbClr val="0000FF"/>
-              </a:solidFill>
-              <a:ea typeface="Arial" charset="0"/>
-              <a:cs typeface="Arial" charset="0"/>
-            </a:endParaRPr>
           </a:p>
         </p:txBody>
       </p:sp>
@@ -45309,13 +45084,6 @@
               </a:rPr>
               <a:t>3</a:t>
             </a:r>
-            <a:endParaRPr lang="en-US" sz="1400" b="0" i="1" dirty="0">
-              <a:solidFill>
-                <a:srgbClr val="0000FF"/>
-              </a:solidFill>
-              <a:ea typeface="Arial" charset="0"/>
-              <a:cs typeface="Arial" charset="0"/>
-            </a:endParaRPr>
           </a:p>
           <a:p>
             <a:pPr algn="r"/>
@@ -45327,17 +45095,7 @@
                 <a:ea typeface="Arial" charset="0"/>
                 <a:cs typeface="Arial" charset="0"/>
               </a:rPr>
-              <a:t>Coflow2 comp. </a:t>
-            </a:r>
-            <a:r>
-              <a:rPr lang="en-US" sz="1400" b="0" i="1" dirty="0">
-                <a:solidFill>
-                  <a:schemeClr val="accent2"/>
-                </a:solidFill>
-                <a:ea typeface="Arial" charset="0"/>
-                <a:cs typeface="Arial" charset="0"/>
-              </a:rPr>
-              <a:t>time = </a:t>
+              <a:t>Coflow2 comp. time = </a:t>
             </a:r>
             <a:r>
               <a:rPr lang="en-US" sz="1400" b="0" i="1" dirty="0" smtClean="0">
@@ -45414,13 +45172,6 @@
               </a:rPr>
               <a:t>L1</a:t>
             </a:r>
-            <a:endParaRPr lang="en-US" sz="1400" b="0" i="1" dirty="0">
-              <a:solidFill>
-                <a:schemeClr val="accent2"/>
-              </a:solidFill>
-              <a:ea typeface="Arial" charset="0"/>
-              <a:cs typeface="Arial" charset="0"/>
-            </a:endParaRPr>
           </a:p>
         </p:txBody>
       </p:sp>
@@ -45456,13 +45207,6 @@
               </a:rPr>
               <a:t>L2</a:t>
             </a:r>
-            <a:endParaRPr lang="en-US" sz="1400" b="0" i="1" dirty="0">
-              <a:solidFill>
-                <a:schemeClr val="accent2"/>
-              </a:solidFill>
-              <a:ea typeface="Arial" charset="0"/>
-              <a:cs typeface="Arial" charset="0"/>
-            </a:endParaRPr>
           </a:p>
         </p:txBody>
       </p:sp>
@@ -45498,13 +45242,6 @@
               </a:rPr>
               <a:t>L1</a:t>
             </a:r>
-            <a:endParaRPr lang="en-US" sz="1400" b="0" i="1" dirty="0">
-              <a:solidFill>
-                <a:schemeClr val="accent2"/>
-              </a:solidFill>
-              <a:ea typeface="Arial" charset="0"/>
-              <a:cs typeface="Arial" charset="0"/>
-            </a:endParaRPr>
           </a:p>
         </p:txBody>
       </p:sp>
@@ -45540,13 +45277,6 @@
               </a:rPr>
               <a:t>L2</a:t>
             </a:r>
-            <a:endParaRPr lang="en-US" sz="1400" b="0" i="1" dirty="0">
-              <a:solidFill>
-                <a:schemeClr val="accent2"/>
-              </a:solidFill>
-              <a:ea typeface="Arial" charset="0"/>
-              <a:cs typeface="Arial" charset="0"/>
-            </a:endParaRPr>
           </a:p>
         </p:txBody>
       </p:sp>
@@ -45582,13 +45312,6 @@
               </a:rPr>
               <a:t>L1</a:t>
             </a:r>
-            <a:endParaRPr lang="en-US" sz="1400" b="0" i="1" dirty="0">
-              <a:solidFill>
-                <a:schemeClr val="accent2"/>
-              </a:solidFill>
-              <a:ea typeface="Arial" charset="0"/>
-              <a:cs typeface="Arial" charset="0"/>
-            </a:endParaRPr>
           </a:p>
         </p:txBody>
       </p:sp>
@@ -45624,13 +45347,6 @@
               </a:rPr>
               <a:t>L2</a:t>
             </a:r>
-            <a:endParaRPr lang="en-US" sz="1400" b="0" i="1" dirty="0">
-              <a:solidFill>
-                <a:schemeClr val="accent2"/>
-              </a:solidFill>
-              <a:ea typeface="Arial" charset="0"/>
-              <a:cs typeface="Arial" charset="0"/>
-            </a:endParaRPr>
           </a:p>
         </p:txBody>
       </p:sp>
@@ -45685,13 +45401,6 @@
                 </a:rPr>
                 <a:t>               Link 1</a:t>
               </a:r>
-              <a:endParaRPr lang="en-US" sz="1400" b="0" dirty="0">
-                <a:solidFill>
-                  <a:schemeClr val="accent2"/>
-                </a:solidFill>
-                <a:ea typeface="Arial" charset="0"/>
-                <a:cs typeface="Arial" charset="0"/>
-              </a:endParaRPr>
             </a:p>
           </p:txBody>
         </p:sp>
@@ -45736,13 +45445,6 @@
                 </a:rPr>
                 <a:t>               Link 2</a:t>
               </a:r>
-              <a:endParaRPr lang="en-US" sz="1400" b="0" dirty="0">
-                <a:solidFill>
-                  <a:schemeClr val="accent2"/>
-                </a:solidFill>
-                <a:ea typeface="Arial" charset="0"/>
-                <a:cs typeface="Arial" charset="0"/>
-              </a:endParaRPr>
             </a:p>
           </p:txBody>
         </p:sp>
@@ -45846,13 +45548,6 @@
                 </a:rPr>
                 <a:t>3 Units</a:t>
               </a:r>
-              <a:endParaRPr lang="en-US" sz="1400" b="0" i="1" dirty="0">
-                <a:solidFill>
-                  <a:schemeClr val="accent2"/>
-                </a:solidFill>
-                <a:ea typeface="Arial" charset="0"/>
-                <a:cs typeface="Arial" charset="0"/>
-              </a:endParaRPr>
             </a:p>
           </p:txBody>
         </p:sp>
@@ -45889,13 +45584,6 @@
                 </a:rPr>
                 <a:t>Coflow 1</a:t>
               </a:r>
-              <a:endParaRPr lang="en-US" sz="1400" b="0" dirty="0">
-                <a:solidFill>
-                  <a:schemeClr val="accent2"/>
-                </a:solidFill>
-                <a:ea typeface="Arial" charset="0"/>
-                <a:cs typeface="Arial" charset="0"/>
-              </a:endParaRPr>
             </a:p>
           </p:txBody>
         </p:sp>
@@ -46156,13 +45844,6 @@
                 </a:rPr>
                 <a:t>6 Units</a:t>
               </a:r>
-              <a:endParaRPr lang="en-US" sz="1400" b="0" i="1" dirty="0">
-                <a:solidFill>
-                  <a:schemeClr val="accent2"/>
-                </a:solidFill>
-                <a:ea typeface="Arial" charset="0"/>
-                <a:cs typeface="Arial" charset="0"/>
-              </a:endParaRPr>
             </a:p>
           </p:txBody>
         </p:sp>
@@ -46199,13 +45880,6 @@
                 </a:rPr>
                 <a:t>Coflow 2</a:t>
               </a:r>
-              <a:endParaRPr lang="en-US" sz="1400" b="0" dirty="0">
-                <a:solidFill>
-                  <a:schemeClr val="accent2"/>
-                </a:solidFill>
-                <a:ea typeface="Arial" charset="0"/>
-                <a:cs typeface="Arial" charset="0"/>
-              </a:endParaRPr>
             </a:p>
           </p:txBody>
         </p:sp>
@@ -46560,13 +46234,6 @@
                 </a:rPr>
                 <a:t>2 Units</a:t>
               </a:r>
-              <a:endParaRPr lang="en-US" sz="1400" b="0" i="1" dirty="0">
-                <a:solidFill>
-                  <a:schemeClr val="accent2"/>
-                </a:solidFill>
-                <a:ea typeface="Arial" charset="0"/>
-                <a:cs typeface="Arial" charset="0"/>
-              </a:endParaRPr>
             </a:p>
           </p:txBody>
         </p:sp>
@@ -48968,11 +48635,23 @@
                   <a:srgbClr val="0000FF"/>
                 </a:solidFill>
               </a:rPr>
-              <a:t>Next lecture</a:t>
+              <a:t>Next </a:t>
+            </a:r>
+            <a:r>
+              <a:rPr lang="en-US" dirty="0" smtClean="0">
+                <a:solidFill>
+                  <a:srgbClr val="0000FF"/>
+                </a:solidFill>
+              </a:rPr>
+              <a:t>week</a:t>
             </a:r>
             <a:r>
               <a:rPr lang="en-US" dirty="0" smtClean="0"/>
-              <a:t>: Wireless and security</a:t>
+              <a:t>: </a:t>
+            </a:r>
+            <a:r>
+              <a:rPr lang="en-US" dirty="0" smtClean="0"/>
+              <a:t>Wireless and security</a:t>
             </a:r>
             <a:endParaRPr lang="en-US" dirty="0"/>
           </a:p>
@@ -49550,11 +49229,6 @@
               </a:rPr>
               <a:t>L2/L3 design</a:t>
             </a:r>
-            <a:endParaRPr lang="en-US" dirty="0" smtClean="0">
-              <a:solidFill>
-                <a:srgbClr val="0000FF"/>
-              </a:solidFill>
-            </a:endParaRPr>
           </a:p>
           <a:p>
             <a:pPr lvl="2"/>
@@ -49564,39 +49238,22 @@
             </a:r>
             <a:r>
               <a:rPr lang="en-US" dirty="0" smtClean="0"/>
-              <a:t>ddressing </a:t>
-            </a:r>
+              <a:t>ddressing / routing / forwarding in the Fat-Tree</a:t>
+            </a:r>
+            <a:endParaRPr lang="en-US" dirty="0"/>
+          </a:p>
+          <a:p>
+            <a:pPr lvl="1"/>
             <a:r>
               <a:rPr lang="en-US" dirty="0" smtClean="0"/>
-              <a:t>/ routing / forwarding in the </a:t>
-            </a:r>
+              <a:t>L4 design</a:t>
+            </a:r>
+          </a:p>
+          <a:p>
+            <a:pPr lvl="2"/>
             <a:r>
               <a:rPr lang="en-US" dirty="0" smtClean="0"/>
-              <a:t>Fat-Tree</a:t>
-            </a:r>
-            <a:endParaRPr lang="en-US" dirty="0"/>
-          </a:p>
-          <a:p>
-            <a:pPr lvl="1"/>
-            <a:r>
-              <a:rPr lang="en-US" dirty="0" smtClean="0"/>
-              <a:t>L4 </a:t>
-            </a:r>
-            <a:r>
-              <a:rPr lang="en-US" dirty="0" smtClean="0"/>
-              <a:t>design</a:t>
-            </a:r>
-            <a:endParaRPr lang="en-US" dirty="0" smtClean="0"/>
-          </a:p>
-          <a:p>
-            <a:pPr lvl="2"/>
-            <a:r>
-              <a:rPr lang="en-US" dirty="0" smtClean="0"/>
-              <a:t>Transport protocol design (w/ Fat-Tree</a:t>
-            </a:r>
-            <a:r>
-              <a:rPr lang="en-US" dirty="0" smtClean="0"/>
-              <a:t>)</a:t>
+              <a:t>Transport protocol design (w/ Fat-Tree)</a:t>
             </a:r>
           </a:p>
           <a:p>

</xml_diff>